<commit_message>
Updated editorial process and editor guidelines
</commit_message>
<xml_diff>
--- a/coversheet.pptx
+++ b/coversheet.pptx
@@ -104,6 +104,11 @@
       </a:defRPr>
     </a:lvl9pPr>
   </p:defaultTextStyle>
+  <p:extLst>
+    <p:ext uri="{EFAFB233-063F-42B5-8137-9DF3F51BA10A}">
+      <p15:sldGuideLst xmlns:p15="http://schemas.microsoft.com/office/powerpoint/2012/main"/>
+    </p:ext>
+  </p:extLst>
 </p:presentation>
 </file>
 
@@ -238,7 +243,7 @@
           <a:p>
             <a:fld id="{DE8B86C2-41EE-4B0E-B1DE-8DD8F010D419}" type="datetimeFigureOut">
               <a:rPr lang="en-US" smtClean="0"/>
-              <a:t>10/22/2024</a:t>
+              <a:t>2/18/2025</a:t>
             </a:fld>
             <a:endParaRPr lang="en-US"/>
           </a:p>
@@ -408,7 +413,7 @@
           <a:p>
             <a:fld id="{DE8B86C2-41EE-4B0E-B1DE-8DD8F010D419}" type="datetimeFigureOut">
               <a:rPr lang="en-US" smtClean="0"/>
-              <a:t>10/22/2024</a:t>
+              <a:t>2/18/2025</a:t>
             </a:fld>
             <a:endParaRPr lang="en-US"/>
           </a:p>
@@ -588,7 +593,7 @@
           <a:p>
             <a:fld id="{DE8B86C2-41EE-4B0E-B1DE-8DD8F010D419}" type="datetimeFigureOut">
               <a:rPr lang="en-US" smtClean="0"/>
-              <a:t>10/22/2024</a:t>
+              <a:t>2/18/2025</a:t>
             </a:fld>
             <a:endParaRPr lang="en-US"/>
           </a:p>
@@ -758,7 +763,7 @@
           <a:p>
             <a:fld id="{DE8B86C2-41EE-4B0E-B1DE-8DD8F010D419}" type="datetimeFigureOut">
               <a:rPr lang="en-US" smtClean="0"/>
-              <a:t>10/22/2024</a:t>
+              <a:t>2/18/2025</a:t>
             </a:fld>
             <a:endParaRPr lang="en-US"/>
           </a:p>
@@ -1002,7 +1007,7 @@
           <a:p>
             <a:fld id="{DE8B86C2-41EE-4B0E-B1DE-8DD8F010D419}" type="datetimeFigureOut">
               <a:rPr lang="en-US" smtClean="0"/>
-              <a:t>10/22/2024</a:t>
+              <a:t>2/18/2025</a:t>
             </a:fld>
             <a:endParaRPr lang="en-US"/>
           </a:p>
@@ -1234,7 +1239,7 @@
           <a:p>
             <a:fld id="{DE8B86C2-41EE-4B0E-B1DE-8DD8F010D419}" type="datetimeFigureOut">
               <a:rPr lang="en-US" smtClean="0"/>
-              <a:t>10/22/2024</a:t>
+              <a:t>2/18/2025</a:t>
             </a:fld>
             <a:endParaRPr lang="en-US"/>
           </a:p>
@@ -1601,7 +1606,7 @@
           <a:p>
             <a:fld id="{DE8B86C2-41EE-4B0E-B1DE-8DD8F010D419}" type="datetimeFigureOut">
               <a:rPr lang="en-US" smtClean="0"/>
-              <a:t>10/22/2024</a:t>
+              <a:t>2/18/2025</a:t>
             </a:fld>
             <a:endParaRPr lang="en-US"/>
           </a:p>
@@ -1719,7 +1724,7 @@
           <a:p>
             <a:fld id="{DE8B86C2-41EE-4B0E-B1DE-8DD8F010D419}" type="datetimeFigureOut">
               <a:rPr lang="en-US" smtClean="0"/>
-              <a:t>10/22/2024</a:t>
+              <a:t>2/18/2025</a:t>
             </a:fld>
             <a:endParaRPr lang="en-US"/>
           </a:p>
@@ -1814,7 +1819,7 @@
           <a:p>
             <a:fld id="{DE8B86C2-41EE-4B0E-B1DE-8DD8F010D419}" type="datetimeFigureOut">
               <a:rPr lang="en-US" smtClean="0"/>
-              <a:t>10/22/2024</a:t>
+              <a:t>2/18/2025</a:t>
             </a:fld>
             <a:endParaRPr lang="en-US"/>
           </a:p>
@@ -2091,7 +2096,7 @@
           <a:p>
             <a:fld id="{DE8B86C2-41EE-4B0E-B1DE-8DD8F010D419}" type="datetimeFigureOut">
               <a:rPr lang="en-US" smtClean="0"/>
-              <a:t>10/22/2024</a:t>
+              <a:t>2/18/2025</a:t>
             </a:fld>
             <a:endParaRPr lang="en-US"/>
           </a:p>
@@ -2348,7 +2353,7 @@
           <a:p>
             <a:fld id="{DE8B86C2-41EE-4B0E-B1DE-8DD8F010D419}" type="datetimeFigureOut">
               <a:rPr lang="en-US" smtClean="0"/>
-              <a:t>10/22/2024</a:t>
+              <a:t>2/18/2025</a:t>
             </a:fld>
             <a:endParaRPr lang="en-US"/>
           </a:p>
@@ -2561,7 +2566,7 @@
           <a:p>
             <a:fld id="{DE8B86C2-41EE-4B0E-B1DE-8DD8F010D419}" type="datetimeFigureOut">
               <a:rPr lang="en-US" smtClean="0"/>
-              <a:t>10/22/2024</a:t>
+              <a:t>2/18/2025</a:t>
             </a:fld>
             <a:endParaRPr lang="en-US"/>
           </a:p>
@@ -2966,41 +2971,6 @@
           <a:chExt cx="0" cy="0"/>
         </a:xfrm>
       </p:grpSpPr>
-      <p:pic>
-        <p:nvPicPr>
-          <p:cNvPr id="4" name="Grafik 3">
-            <a:extLst>
-              <a:ext uri="{FF2B5EF4-FFF2-40B4-BE49-F238E27FC236}">
-                <a16:creationId xmlns:a16="http://schemas.microsoft.com/office/drawing/2014/main" id="{83EED446-C476-45BC-B8DE-A610040A47BE}"/>
-              </a:ext>
-            </a:extLst>
-          </p:cNvPr>
-          <p:cNvPicPr>
-            <a:picLocks noChangeAspect="1"/>
-          </p:cNvPicPr>
-          <p:nvPr/>
-        </p:nvPicPr>
-        <p:blipFill rotWithShape="1">
-          <a:blip r:embed="rId2">
-            <a:extLst>
-              <a:ext uri="{28A0092B-C50C-407E-A947-70E740481C1C}">
-                <a14:useLocalDpi xmlns:a14="http://schemas.microsoft.com/office/drawing/2010/main" val="0"/>
-              </a:ext>
-            </a:extLst>
-          </a:blip>
-          <a:srcRect l="677" t="464" b="695"/>
-          <a:stretch/>
-        </p:blipFill>
-        <p:spPr>
-          <a:xfrm>
-            <a:off x="552645" y="184150"/>
-            <a:ext cx="324190" cy="406400"/>
-          </a:xfrm>
-          <a:prstGeom prst="rect">
-            <a:avLst/>
-          </a:prstGeom>
-        </p:spPr>
-      </p:pic>
       <p:sp>
         <p:nvSpPr>
           <p:cNvPr id="5" name="Rechteck 4">
@@ -3015,14 +2985,19 @@
         </p:nvSpPr>
         <p:spPr>
           <a:xfrm>
-            <a:off x="876835" y="184150"/>
-            <a:ext cx="5492750" cy="406400"/>
+            <a:off x="552645" y="184150"/>
+            <a:ext cx="5816940" cy="406400"/>
           </a:xfrm>
           <a:prstGeom prst="rect">
             <a:avLst/>
           </a:prstGeom>
+          <a:solidFill>
+            <a:schemeClr val="bg1"/>
+          </a:solidFill>
           <a:ln>
-            <a:noFill/>
+            <a:solidFill>
+              <a:schemeClr val="tx1"/>
+            </a:solidFill>
           </a:ln>
         </p:spPr>
         <p:style>
@@ -3046,12 +3021,9 @@
           <a:lstStyle/>
           <a:p>
             <a:pPr algn="ctr"/>
-            <a:r>
-              <a:rPr lang="en-US" sz="2000" dirty="0">
-                <a:latin typeface="Bahnschrift SemiBold" panose="020B0502040204020203" pitchFamily="34" charset="0"/>
-              </a:rPr>
-              <a:t>REPLICATION RESEARCH</a:t>
-            </a:r>
+            <a:endParaRPr lang="en-US" sz="2000" dirty="0">
+              <a:latin typeface="Bahnschrift SemiBold" panose="020B0502040204020203" pitchFamily="34" charset="0"/>
+            </a:endParaRPr>
           </a:p>
         </p:txBody>
       </p:sp>
@@ -3070,7 +3042,7 @@
         <p:spPr>
           <a:xfrm>
             <a:off x="1143000" y="2330995"/>
-            <a:ext cx="4572000" cy="923330"/>
+            <a:ext cx="4572000" cy="1200329"/>
           </a:xfrm>
           <a:prstGeom prst="rect">
             <a:avLst/>
@@ -3089,7 +3061,7 @@
                 <a:latin typeface="Times New Roman" panose="02020603050405020304" pitchFamily="18" charset="0"/>
                 <a:cs typeface="Times New Roman" panose="02020603050405020304" pitchFamily="18" charset="0"/>
               </a:rPr>
-              <a:t>Sample title</a:t>
+              <a:t>Example Title:</a:t>
             </a:r>
             <a:br>
               <a:rPr lang="en-US" b="1" dirty="0">
@@ -3102,7 +3074,7 @@
                 <a:latin typeface="Times New Roman" panose="02020603050405020304" pitchFamily="18" charset="0"/>
                 <a:cs typeface="Times New Roman" panose="02020603050405020304" pitchFamily="18" charset="0"/>
               </a:rPr>
-              <a:t>A Replication of Smith and Meyer (Nature Human Behavior, 2042)</a:t>
+              <a:t>A Replication of Author A and Author B (Abbrev. Journal Name, Year of Orig. Publication)</a:t>
             </a:r>
           </a:p>
         </p:txBody>
@@ -3122,7 +3094,7 @@
         <p:spPr>
           <a:xfrm>
             <a:off x="552645" y="590550"/>
-            <a:ext cx="5816939" cy="1013118"/>
+            <a:ext cx="5816939" cy="1214114"/>
           </a:xfrm>
           <a:prstGeom prst="rect">
             <a:avLst/>
@@ -3230,6 +3202,20 @@
             </a:endParaRPr>
           </a:p>
           <a:p>
+            <a:endParaRPr lang="en-US" sz="800" dirty="0">
+              <a:solidFill>
+                <a:schemeClr val="tx1"/>
+              </a:solidFill>
+            </a:endParaRPr>
+          </a:p>
+          <a:p>
+            <a:endParaRPr lang="en-US" sz="800" dirty="0">
+              <a:solidFill>
+                <a:schemeClr val="tx1"/>
+              </a:solidFill>
+            </a:endParaRPr>
+          </a:p>
+          <a:p>
             <a:r>
               <a:rPr lang="en-US" sz="800" dirty="0">
                 <a:solidFill>
@@ -3243,7 +3229,7 @@
                 <a:solidFill>
                   <a:schemeClr val="tx1"/>
                 </a:solidFill>
-                <a:hlinkClick r:id="rId3"/>
+                <a:hlinkClick r:id="rId2"/>
               </a:rPr>
               <a:t>https://osf.io/12345/</a:t>
             </a:r>
@@ -3270,7 +3256,7 @@
                 <a:solidFill>
                   <a:schemeClr val="tx1"/>
                 </a:solidFill>
-                <a:hlinkClick r:id="rId3"/>
+                <a:hlinkClick r:id="rId2"/>
               </a:rPr>
               <a:t>https://osf.io/12345/</a:t>
             </a:r>
@@ -3297,7 +3283,7 @@
                 <a:solidFill>
                   <a:schemeClr val="tx1"/>
                 </a:solidFill>
-                <a:hlinkClick r:id="rId3"/>
+                <a:hlinkClick r:id="rId2"/>
               </a:rPr>
               <a:t>https://osf.io/12345/</a:t>
             </a:r>
@@ -3324,7 +3310,7 @@
                 <a:solidFill>
                   <a:schemeClr val="tx1"/>
                 </a:solidFill>
-                <a:hlinkClick r:id="rId3"/>
+                <a:hlinkClick r:id="rId2"/>
               </a:rPr>
               <a:t>https://osf.io/12345/</a:t>
             </a:r>
@@ -3356,7 +3342,7 @@
                 <a:solidFill>
                   <a:schemeClr val="tx1"/>
                 </a:solidFill>
-                <a:hlinkClick r:id="rId3"/>
+                <a:hlinkClick r:id="rId2"/>
               </a:rPr>
               <a:t>https://osf.io/12345/</a:t>
             </a:r>
@@ -3377,23 +3363,6 @@
             </a:endParaRPr>
           </a:p>
           <a:p>
-            <a:r>
-              <a:rPr lang="en-US" sz="800" dirty="0">
-                <a:solidFill>
-                  <a:schemeClr val="tx1"/>
-                </a:solidFill>
-              </a:rPr>
-              <a:t>Reproducibility report: </a:t>
-            </a:r>
-            <a:r>
-              <a:rPr lang="en-US" sz="800" dirty="0">
-                <a:solidFill>
-                  <a:schemeClr val="tx1"/>
-                </a:solidFill>
-                <a:hlinkClick r:id="rId3"/>
-              </a:rPr>
-              <a:t>https://osf.io/12345/</a:t>
-            </a:r>
             <a:endParaRPr lang="en-US" sz="800" dirty="0">
               <a:solidFill>
                 <a:schemeClr val="tx1"/>
@@ -3401,23 +3370,6 @@
             </a:endParaRPr>
           </a:p>
           <a:p>
-            <a:r>
-              <a:rPr lang="en-US" sz="800" dirty="0">
-                <a:solidFill>
-                  <a:schemeClr val="tx1"/>
-                </a:solidFill>
-              </a:rPr>
-              <a:t>Review report: </a:t>
-            </a:r>
-            <a:r>
-              <a:rPr lang="en-US" sz="800" dirty="0">
-                <a:solidFill>
-                  <a:schemeClr val="tx1"/>
-                </a:solidFill>
-                <a:hlinkClick r:id="rId3"/>
-              </a:rPr>
-              <a:t>https://osf.io/12345/</a:t>
-            </a:r>
             <a:endParaRPr lang="en-US" sz="800" dirty="0">
               <a:solidFill>
                 <a:schemeClr val="tx1"/>
@@ -3425,6 +3377,23 @@
             </a:endParaRPr>
           </a:p>
           <a:p>
+            <a:r>
+              <a:rPr lang="en-US" sz="800" dirty="0">
+                <a:solidFill>
+                  <a:schemeClr val="tx1"/>
+                </a:solidFill>
+              </a:rPr>
+              <a:t>Reproducibility report: </a:t>
+            </a:r>
+            <a:r>
+              <a:rPr lang="en-US" sz="800" dirty="0">
+                <a:solidFill>
+                  <a:schemeClr val="tx1"/>
+                </a:solidFill>
+                <a:hlinkClick r:id="rId2"/>
+              </a:rPr>
+              <a:t>https://osf.io/12345/</a:t>
+            </a:r>
             <a:endParaRPr lang="en-US" sz="800" dirty="0">
               <a:solidFill>
                 <a:schemeClr val="tx1"/>
@@ -3438,37 +3407,100 @@
                   <a:schemeClr val="tx1"/>
                 </a:solidFill>
               </a:rPr>
-              <a:t>Edited by: Lukas Röseler</a:t>
-            </a:r>
-          </a:p>
-          <a:p>
+              <a:t>Review report: </a:t>
+            </a:r>
             <a:r>
               <a:rPr lang="en-US" sz="800" dirty="0">
                 <a:solidFill>
                   <a:schemeClr val="tx1"/>
                 </a:solidFill>
-              </a:rPr>
-              <a:t>Reviewer 1: Person Name</a:t>
-            </a:r>
-          </a:p>
-          <a:p>
+                <a:hlinkClick r:id="rId2"/>
+              </a:rPr>
+              <a:t>https://osf.io/12345/</a:t>
+            </a:r>
+            <a:endParaRPr lang="en-US" sz="800" dirty="0">
+              <a:solidFill>
+                <a:schemeClr val="tx1"/>
+              </a:solidFill>
+            </a:endParaRPr>
+          </a:p>
+          <a:p>
+            <a:r>
+              <a:rPr lang="en-US" sz="800" dirty="0" err="1">
+                <a:solidFill>
+                  <a:schemeClr val="tx1"/>
+                </a:solidFill>
+              </a:rPr>
+              <a:t>Codecheck</a:t>
+            </a:r>
             <a:r>
               <a:rPr lang="en-US" sz="800" dirty="0">
                 <a:solidFill>
                   <a:schemeClr val="tx1"/>
                 </a:solidFill>
               </a:rPr>
-              <a:t>Reviewer 2: Human Being</a:t>
-            </a:r>
-          </a:p>
-          <a:p>
+              <a:t> certificate: </a:t>
+            </a:r>
             <a:r>
               <a:rPr lang="en-US" sz="800" dirty="0">
                 <a:solidFill>
                   <a:schemeClr val="tx1"/>
                 </a:solidFill>
-              </a:rPr>
-              <a:t>Reproducer: Researching Entity</a:t>
+                <a:hlinkClick r:id="rId2"/>
+              </a:rPr>
+              <a:t>https://osf.io/12345/</a:t>
+            </a:r>
+            <a:endParaRPr lang="en-US" sz="800" dirty="0">
+              <a:solidFill>
+                <a:schemeClr val="tx1"/>
+              </a:solidFill>
+            </a:endParaRPr>
+          </a:p>
+          <a:p>
+            <a:endParaRPr lang="en-US" sz="800" dirty="0">
+              <a:solidFill>
+                <a:schemeClr val="tx1"/>
+              </a:solidFill>
+            </a:endParaRPr>
+          </a:p>
+          <a:p>
+            <a:r>
+              <a:rPr lang="en-US" sz="800" dirty="0">
+                <a:solidFill>
+                  <a:schemeClr val="tx1"/>
+                </a:solidFill>
+              </a:rPr>
+              <a:t>Edited by: Editor Name</a:t>
+            </a:r>
+          </a:p>
+          <a:p>
+            <a:r>
+              <a:rPr lang="en-US" sz="800" dirty="0">
+                <a:solidFill>
+                  <a:schemeClr val="tx1"/>
+                </a:solidFill>
+              </a:rPr>
+              <a:t>Reviewer 1: Person Name</a:t>
+            </a:r>
+          </a:p>
+          <a:p>
+            <a:r>
+              <a:rPr lang="en-US" sz="800" dirty="0">
+                <a:solidFill>
+                  <a:schemeClr val="tx1"/>
+                </a:solidFill>
+              </a:rPr>
+              <a:t>Reviewer 2: Person Name</a:t>
+            </a:r>
+          </a:p>
+          <a:p>
+            <a:r>
+              <a:rPr lang="en-US" sz="800" dirty="0">
+                <a:solidFill>
+                  <a:schemeClr val="tx1"/>
+                </a:solidFill>
+              </a:rPr>
+              <a:t>Reproducer: Researcher Name</a:t>
             </a:r>
           </a:p>
         </p:txBody>
@@ -3488,7 +3520,7 @@
           <p:nvPr/>
         </p:nvPicPr>
         <p:blipFill>
-          <a:blip r:embed="rId4"/>
+          <a:blip r:embed="rId3"/>
           <a:stretch>
             <a:fillRect/>
           </a:stretch>
@@ -3518,7 +3550,7 @@
           <p:nvPr/>
         </p:nvPicPr>
         <p:blipFill>
-          <a:blip r:embed="rId5"/>
+          <a:blip r:embed="rId4"/>
           <a:stretch>
             <a:fillRect/>
           </a:stretch>
@@ -3548,7 +3580,7 @@
           <p:nvPr/>
         </p:nvPicPr>
         <p:blipFill>
-          <a:blip r:embed="rId6">
+          <a:blip r:embed="rId5">
             <a:extLst>
               <a:ext uri="{28A0092B-C50C-407E-A947-70E740481C1C}">
                 <a14:useLocalDpi xmlns:a14="http://schemas.microsoft.com/office/drawing/2010/main" val="0"/>
@@ -3584,7 +3616,7 @@
           <p:nvPr/>
         </p:nvPicPr>
         <p:blipFill>
-          <a:blip r:embed="rId7">
+          <a:blip r:embed="rId6">
             <a:extLst>
               <a:ext uri="{28A0092B-C50C-407E-A947-70E740481C1C}">
                 <a14:useLocalDpi xmlns:a14="http://schemas.microsoft.com/office/drawing/2010/main" val="0"/>
@@ -3620,7 +3652,7 @@
           <p:nvPr/>
         </p:nvPicPr>
         <p:blipFill>
-          <a:blip r:embed="rId8">
+          <a:blip r:embed="rId7">
             <a:extLst>
               <a:ext uri="{28A0092B-C50C-407E-A947-70E740481C1C}">
                 <a14:useLocalDpi xmlns:a14="http://schemas.microsoft.com/office/drawing/2010/main" val="0"/>
@@ -3656,7 +3688,7 @@
           <p:nvPr/>
         </p:nvPicPr>
         <p:blipFill>
-          <a:blip r:embed="rId9">
+          <a:blip r:embed="rId8">
             <a:extLst>
               <a:ext uri="{28A0092B-C50C-407E-A947-70E740481C1C}">
                 <a14:useLocalDpi xmlns:a14="http://schemas.microsoft.com/office/drawing/2010/main" val="0"/>
@@ -4600,7 +4632,7 @@
           <p:nvPr/>
         </p:nvPicPr>
         <p:blipFill rotWithShape="1">
-          <a:blip r:embed="rId10">
+          <a:blip r:embed="rId9">
             <a:extLst>
               <a:ext uri="{28A0092B-C50C-407E-A947-70E740481C1C}">
                 <a14:useLocalDpi xmlns:a14="http://schemas.microsoft.com/office/drawing/2010/main" val="0"/>
@@ -4645,7 +4677,7 @@
           <p:nvPr/>
         </p:nvPicPr>
         <p:blipFill>
-          <a:blip r:embed="rId11"/>
+          <a:blip r:embed="rId10"/>
           <a:stretch>
             <a:fillRect/>
           </a:stretch>
@@ -4675,7 +4707,7 @@
           <p:nvPr/>
         </p:nvPicPr>
         <p:blipFill rotWithShape="1">
-          <a:blip r:embed="rId10">
+          <a:blip r:embed="rId9">
             <a:extLst>
               <a:ext uri="{28A0092B-C50C-407E-A947-70E740481C1C}">
                 <a14:useLocalDpi xmlns:a14="http://schemas.microsoft.com/office/drawing/2010/main" val="0"/>
@@ -4758,7 +4790,7 @@
           <p:nvPr/>
         </p:nvPicPr>
         <p:blipFill>
-          <a:blip r:embed="rId11"/>
+          <a:blip r:embed="rId10"/>
           <a:stretch>
             <a:fillRect/>
           </a:stretch>
@@ -4826,7 +4858,7 @@
           <p:nvPr/>
         </p:nvPicPr>
         <p:blipFill>
-          <a:blip r:embed="rId12"/>
+          <a:blip r:embed="rId11"/>
           <a:stretch>
             <a:fillRect/>
           </a:stretch>
@@ -4835,6 +4867,81 @@
           <a:xfrm>
             <a:off x="552645" y="9391650"/>
             <a:ext cx="1436117" cy="360698"/>
+          </a:xfrm>
+          <a:prstGeom prst="rect">
+            <a:avLst/>
+          </a:prstGeom>
+        </p:spPr>
+      </p:pic>
+      <p:sp>
+        <p:nvSpPr>
+          <p:cNvPr id="2" name="Textfeld 1">
+            <a:extLst>
+              <a:ext uri="{FF2B5EF4-FFF2-40B4-BE49-F238E27FC236}">
+                <a16:creationId xmlns:a16="http://schemas.microsoft.com/office/drawing/2014/main" id="{42247331-EB2E-38C2-EAB1-98A6BC33D968}"/>
+              </a:ext>
+            </a:extLst>
+          </p:cNvPr>
+          <p:cNvSpPr txBox="1"/>
+          <p:nvPr/>
+        </p:nvSpPr>
+        <p:spPr>
+          <a:xfrm>
+            <a:off x="488416" y="7947839"/>
+            <a:ext cx="5881168" cy="461665"/>
+          </a:xfrm>
+          <a:prstGeom prst="rect">
+            <a:avLst/>
+          </a:prstGeom>
+          <a:noFill/>
+        </p:spPr>
+        <p:txBody>
+          <a:bodyPr wrap="square">
+            <a:spAutoFit/>
+          </a:bodyPr>
+          <a:lstStyle/>
+          <a:p>
+            <a:pPr algn="ctr"/>
+            <a:r>
+              <a:rPr lang="en-US" sz="1200" i="1" dirty="0">
+                <a:latin typeface="Times New Roman" panose="02020603050405020304" pitchFamily="18" charset="0"/>
+                <a:cs typeface="Times New Roman" panose="02020603050405020304" pitchFamily="18" charset="0"/>
+              </a:rPr>
+              <a:t>This is the accepted version of the article that has undergone peer-review and a reproducibility check. It has not yet been copy-edited.</a:t>
+            </a:r>
+          </a:p>
+        </p:txBody>
+      </p:sp>
+      <p:pic>
+        <p:nvPicPr>
+          <p:cNvPr id="6" name="Grafik 5">
+            <a:extLst>
+              <a:ext uri="{FF2B5EF4-FFF2-40B4-BE49-F238E27FC236}">
+                <a16:creationId xmlns:a16="http://schemas.microsoft.com/office/drawing/2014/main" id="{6E3B964E-EFAE-D6B3-975A-AF1F4F3DDD59}"/>
+              </a:ext>
+            </a:extLst>
+          </p:cNvPr>
+          <p:cNvPicPr>
+            <a:picLocks noChangeAspect="1"/>
+          </p:cNvPicPr>
+          <p:nvPr/>
+        </p:nvPicPr>
+        <p:blipFill>
+          <a:blip r:embed="rId12">
+            <a:extLst>
+              <a:ext uri="{28A0092B-C50C-407E-A947-70E740481C1C}">
+                <a14:useLocalDpi xmlns:a14="http://schemas.microsoft.com/office/drawing/2010/main" val="0"/>
+              </a:ext>
+            </a:extLst>
+          </a:blip>
+          <a:stretch>
+            <a:fillRect/>
+          </a:stretch>
+        </p:blipFill>
+        <p:spPr>
+          <a:xfrm>
+            <a:off x="572319" y="200597"/>
+            <a:ext cx="1706061" cy="369911"/>
           </a:xfrm>
           <a:prstGeom prst="rect">
             <a:avLst/>

</xml_diff>